<commit_message>
Additional changes and files
</commit_message>
<xml_diff>
--- a/CaseStudy1-ver2.pptx
+++ b/CaseStudy1-ver2.pptx
@@ -5,7 +5,7 @@
     <p:sldMasterId id="2147483648" r:id="rId1"/>
   </p:sldMasterIdLst>
   <p:notesMasterIdLst>
-    <p:notesMasterId r:id="rId11"/>
+    <p:notesMasterId r:id="rId12"/>
   </p:notesMasterIdLst>
   <p:sldIdLst>
     <p:sldId id="256" r:id="rId2"/>
@@ -14,9 +14,10 @@
     <p:sldId id="259" r:id="rId5"/>
     <p:sldId id="260" r:id="rId6"/>
     <p:sldId id="261" r:id="rId7"/>
-    <p:sldId id="262" r:id="rId8"/>
-    <p:sldId id="263" r:id="rId9"/>
-    <p:sldId id="264" r:id="rId10"/>
+    <p:sldId id="265" r:id="rId8"/>
+    <p:sldId id="262" r:id="rId9"/>
+    <p:sldId id="263" r:id="rId10"/>
+    <p:sldId id="264" r:id="rId11"/>
   </p:sldIdLst>
   <p:sldSz cx="12192000" cy="6858000"/>
   <p:notesSz cx="6858000" cy="9144000"/>
@@ -3011,7 +3012,7 @@
           <a:p>
             <a:fld id="{F94C72C1-0CF8-4C9D-A8F5-B32037085641}" type="datetimeFigureOut">
               <a:rPr lang="en-US" smtClean="0"/>
-              <a:t>6/23/2019</a:t>
+              <a:t>6/24/2019</a:t>
             </a:fld>
             <a:endParaRPr lang="en-US"/>
           </a:p>
@@ -3537,7 +3538,7 @@
           <a:p>
             <a:fld id="{F268D4B9-CB16-4F07-AB78-8C1A0B5F7AD6}" type="slidenum">
               <a:rPr lang="en-US" smtClean="0"/>
-              <a:t>8</a:t>
+              <a:t>9</a:t>
             </a:fld>
             <a:endParaRPr lang="en-US"/>
           </a:p>
@@ -3703,7 +3704,7 @@
           <a:p>
             <a:fld id="{C37B4372-DDF0-5549-BEFE-0E95719034E3}" type="datetimeFigureOut">
               <a:rPr lang="en-US" smtClean="0"/>
-              <a:t>6/23/2019</a:t>
+              <a:t>6/24/2019</a:t>
             </a:fld>
             <a:endParaRPr lang="en-US"/>
           </a:p>
@@ -3901,7 +3902,7 @@
           <a:p>
             <a:fld id="{C37B4372-DDF0-5549-BEFE-0E95719034E3}" type="datetimeFigureOut">
               <a:rPr lang="en-US" smtClean="0"/>
-              <a:t>6/23/2019</a:t>
+              <a:t>6/24/2019</a:t>
             </a:fld>
             <a:endParaRPr lang="en-US"/>
           </a:p>
@@ -4109,7 +4110,7 @@
           <a:p>
             <a:fld id="{C37B4372-DDF0-5549-BEFE-0E95719034E3}" type="datetimeFigureOut">
               <a:rPr lang="en-US" smtClean="0"/>
-              <a:t>6/23/2019</a:t>
+              <a:t>6/24/2019</a:t>
             </a:fld>
             <a:endParaRPr lang="en-US"/>
           </a:p>
@@ -4307,7 +4308,7 @@
           <a:p>
             <a:fld id="{C37B4372-DDF0-5549-BEFE-0E95719034E3}" type="datetimeFigureOut">
               <a:rPr lang="en-US" smtClean="0"/>
-              <a:t>6/23/2019</a:t>
+              <a:t>6/24/2019</a:t>
             </a:fld>
             <a:endParaRPr lang="en-US"/>
           </a:p>
@@ -4582,7 +4583,7 @@
           <a:p>
             <a:fld id="{C37B4372-DDF0-5549-BEFE-0E95719034E3}" type="datetimeFigureOut">
               <a:rPr lang="en-US" smtClean="0"/>
-              <a:t>6/23/2019</a:t>
+              <a:t>6/24/2019</a:t>
             </a:fld>
             <a:endParaRPr lang="en-US"/>
           </a:p>
@@ -4847,7 +4848,7 @@
           <a:p>
             <a:fld id="{C37B4372-DDF0-5549-BEFE-0E95719034E3}" type="datetimeFigureOut">
               <a:rPr lang="en-US" smtClean="0"/>
-              <a:t>6/23/2019</a:t>
+              <a:t>6/24/2019</a:t>
             </a:fld>
             <a:endParaRPr lang="en-US"/>
           </a:p>
@@ -5259,7 +5260,7 @@
           <a:p>
             <a:fld id="{C37B4372-DDF0-5549-BEFE-0E95719034E3}" type="datetimeFigureOut">
               <a:rPr lang="en-US" smtClean="0"/>
-              <a:t>6/23/2019</a:t>
+              <a:t>6/24/2019</a:t>
             </a:fld>
             <a:endParaRPr lang="en-US"/>
           </a:p>
@@ -5400,7 +5401,7 @@
           <a:p>
             <a:fld id="{C37B4372-DDF0-5549-BEFE-0E95719034E3}" type="datetimeFigureOut">
               <a:rPr lang="en-US" smtClean="0"/>
-              <a:t>6/23/2019</a:t>
+              <a:t>6/24/2019</a:t>
             </a:fld>
             <a:endParaRPr lang="en-US"/>
           </a:p>
@@ -5513,7 +5514,7 @@
           <a:p>
             <a:fld id="{C37B4372-DDF0-5549-BEFE-0E95719034E3}" type="datetimeFigureOut">
               <a:rPr lang="en-US" smtClean="0"/>
-              <a:t>6/23/2019</a:t>
+              <a:t>6/24/2019</a:t>
             </a:fld>
             <a:endParaRPr lang="en-US"/>
           </a:p>
@@ -5824,7 +5825,7 @@
           <a:p>
             <a:fld id="{C37B4372-DDF0-5549-BEFE-0E95719034E3}" type="datetimeFigureOut">
               <a:rPr lang="en-US" smtClean="0"/>
-              <a:t>6/23/2019</a:t>
+              <a:t>6/24/2019</a:t>
             </a:fld>
             <a:endParaRPr lang="en-US"/>
           </a:p>
@@ -6112,7 +6113,7 @@
           <a:p>
             <a:fld id="{C37B4372-DDF0-5549-BEFE-0E95719034E3}" type="datetimeFigureOut">
               <a:rPr lang="en-US" smtClean="0"/>
-              <a:t>6/23/2019</a:t>
+              <a:t>6/24/2019</a:t>
             </a:fld>
             <a:endParaRPr lang="en-US"/>
           </a:p>
@@ -6353,7 +6354,7 @@
           <a:p>
             <a:fld id="{C37B4372-DDF0-5549-BEFE-0E95719034E3}" type="datetimeFigureOut">
               <a:rPr lang="en-US" smtClean="0"/>
-              <a:t>6/23/2019</a:t>
+              <a:t>6/24/2019</a:t>
             </a:fld>
             <a:endParaRPr lang="en-US"/>
           </a:p>
@@ -7435,6 +7436,202 @@
 </p:sld>
 </file>
 
+<file path=ppt/slides/slide10.xml><?xml version="1.0" encoding="utf-8"?>
+<p:sld xmlns:a="http://schemas.openxmlformats.org/drawingml/2006/main" xmlns:r="http://schemas.openxmlformats.org/officeDocument/2006/relationships" xmlns:p="http://schemas.openxmlformats.org/presentationml/2006/main">
+  <p:cSld>
+    <p:bg>
+      <p:bgPr>
+        <a:solidFill>
+          <a:schemeClr val="bg1"/>
+        </a:solidFill>
+        <a:effectLst/>
+      </p:bgPr>
+    </p:bg>
+    <p:spTree>
+      <p:nvGrpSpPr>
+        <p:cNvPr id="1" name=""/>
+        <p:cNvGrpSpPr/>
+        <p:nvPr/>
+      </p:nvGrpSpPr>
+      <p:grpSpPr>
+        <a:xfrm>
+          <a:off x="0" y="0"/>
+          <a:ext cx="0" cy="0"/>
+          <a:chOff x="0" y="0"/>
+          <a:chExt cx="0" cy="0"/>
+        </a:xfrm>
+      </p:grpSpPr>
+      <p:sp>
+        <p:nvSpPr>
+          <p:cNvPr id="9" name="Rectangle 8">
+            <a:extLst>
+              <a:ext uri="{FF2B5EF4-FFF2-40B4-BE49-F238E27FC236}">
+                <a16:creationId xmlns:a16="http://schemas.microsoft.com/office/drawing/2014/main" id="{32BC26D8-82FB-445E-AA49-62A77D7C1EE0}"/>
+              </a:ext>
+              <a:ext uri="{C183D7F6-B498-43B3-948B-1728B52AA6E4}">
+                <adec:decorative xmlns:adec="http://schemas.microsoft.com/office/drawing/2017/decorative" val="1"/>
+              </a:ext>
+            </a:extLst>
+          </p:cNvPr>
+          <p:cNvSpPr>
+            <a:spLocks noGrp="1" noRot="1" noChangeAspect="1" noMove="1" noResize="1" noEditPoints="1" noAdjustHandles="1" noChangeArrowheads="1" noChangeShapeType="1" noTextEdit="1"/>
+          </p:cNvSpPr>
+          <p:nvPr>
+            <p:extLst>
+              <p:ext uri="{386F3935-93C4-4BCD-93E2-E3B085C9AB24}">
+                <p16:designElem xmlns:p16="http://schemas.microsoft.com/office/powerpoint/2015/main" val="1"/>
+              </p:ext>
+            </p:extLst>
+          </p:nvPr>
+        </p:nvSpPr>
+        <p:spPr>
+          <a:xfrm>
+            <a:off x="0" y="0"/>
+            <a:ext cx="12192000" cy="6858000"/>
+          </a:xfrm>
+          <a:prstGeom prst="rect">
+            <a:avLst/>
+          </a:prstGeom>
+          <a:solidFill>
+            <a:srgbClr val="573B60"/>
+          </a:solidFill>
+          <a:ln>
+            <a:noFill/>
+          </a:ln>
+        </p:spPr>
+        <p:style>
+          <a:lnRef idx="2">
+            <a:schemeClr val="accent1">
+              <a:shade val="50000"/>
+            </a:schemeClr>
+          </a:lnRef>
+          <a:fillRef idx="1">
+            <a:schemeClr val="accent1"/>
+          </a:fillRef>
+          <a:effectRef idx="0">
+            <a:schemeClr val="accent1"/>
+          </a:effectRef>
+          <a:fontRef idx="minor">
+            <a:schemeClr val="lt1"/>
+          </a:fontRef>
+        </p:style>
+        <p:txBody>
+          <a:bodyPr rtlCol="0" anchor="ctr"/>
+          <a:lstStyle/>
+          <a:p>
+            <a:pPr algn="ctr"/>
+            <a:endParaRPr lang="en-US"/>
+          </a:p>
+        </p:txBody>
+      </p:sp>
+      <p:sp>
+        <p:nvSpPr>
+          <p:cNvPr id="18" name="Rectangle 10">
+            <a:extLst>
+              <a:ext uri="{FF2B5EF4-FFF2-40B4-BE49-F238E27FC236}">
+                <a16:creationId xmlns:a16="http://schemas.microsoft.com/office/drawing/2014/main" id="{CB44330D-EA18-4254-AA95-EB49948539B8}"/>
+              </a:ext>
+              <a:ext uri="{C183D7F6-B498-43B3-948B-1728B52AA6E4}">
+                <adec:decorative xmlns:adec="http://schemas.microsoft.com/office/drawing/2017/decorative" val="1"/>
+              </a:ext>
+            </a:extLst>
+          </p:cNvPr>
+          <p:cNvSpPr>
+            <a:spLocks noGrp="1" noRot="1" noChangeAspect="1" noMove="1" noResize="1" noEditPoints="1" noAdjustHandles="1" noChangeArrowheads="1" noChangeShapeType="1" noTextEdit="1"/>
+          </p:cNvSpPr>
+          <p:nvPr>
+            <p:extLst>
+              <p:ext uri="{386F3935-93C4-4BCD-93E2-E3B085C9AB24}">
+                <p16:designElem xmlns:p16="http://schemas.microsoft.com/office/powerpoint/2015/main" val="1"/>
+              </p:ext>
+            </p:extLst>
+          </p:nvPr>
+        </p:nvSpPr>
+        <p:spPr>
+          <a:xfrm>
+            <a:off x="477012" y="480060"/>
+            <a:ext cx="11237976" cy="5897880"/>
+          </a:xfrm>
+          <a:prstGeom prst="rect">
+            <a:avLst/>
+          </a:prstGeom>
+          <a:solidFill>
+            <a:srgbClr val="FFFFFF"/>
+          </a:solidFill>
+          <a:ln>
+            <a:noFill/>
+          </a:ln>
+        </p:spPr>
+        <p:style>
+          <a:lnRef idx="2">
+            <a:schemeClr val="accent1">
+              <a:shade val="50000"/>
+            </a:schemeClr>
+          </a:lnRef>
+          <a:fillRef idx="1">
+            <a:schemeClr val="accent1"/>
+          </a:fillRef>
+          <a:effectRef idx="0">
+            <a:schemeClr val="accent1"/>
+          </a:effectRef>
+          <a:fontRef idx="minor">
+            <a:schemeClr val="lt1"/>
+          </a:fontRef>
+        </p:style>
+        <p:txBody>
+          <a:bodyPr rtlCol="0" anchor="ctr"/>
+          <a:lstStyle/>
+          <a:p>
+            <a:pPr algn="ctr"/>
+            <a:endParaRPr lang="en-US"/>
+          </a:p>
+        </p:txBody>
+      </p:sp>
+      <p:pic>
+        <p:nvPicPr>
+          <p:cNvPr id="4" name="Content Placeholder 3">
+            <a:extLst>
+              <a:ext uri="{FF2B5EF4-FFF2-40B4-BE49-F238E27FC236}">
+                <a16:creationId xmlns:a16="http://schemas.microsoft.com/office/drawing/2014/main" id="{AEA84A54-3E3C-47A8-B2E7-7A4F3ED57571}"/>
+              </a:ext>
+            </a:extLst>
+          </p:cNvPr>
+          <p:cNvPicPr>
+            <a:picLocks noGrp="1" noChangeAspect="1"/>
+          </p:cNvPicPr>
+          <p:nvPr>
+            <p:ph idx="1"/>
+          </p:nvPr>
+        </p:nvPicPr>
+        <p:blipFill>
+          <a:blip r:embed="rId2"/>
+          <a:stretch>
+            <a:fillRect/>
+          </a:stretch>
+        </p:blipFill>
+        <p:spPr>
+          <a:xfrm>
+            <a:off x="2044316" y="643467"/>
+            <a:ext cx="8103367" cy="5571066"/>
+          </a:xfrm>
+          <a:prstGeom prst="rect">
+            <a:avLst/>
+          </a:prstGeom>
+        </p:spPr>
+      </p:pic>
+    </p:spTree>
+    <p:extLst>
+      <p:ext uri="{BB962C8B-B14F-4D97-AF65-F5344CB8AC3E}">
+        <p14:creationId xmlns:p14="http://schemas.microsoft.com/office/powerpoint/2010/main" val="1174345792"/>
+      </p:ext>
+    </p:extLst>
+  </p:cSld>
+  <p:clrMapOvr>
+    <a:masterClrMapping/>
+  </p:clrMapOvr>
+</p:sld>
+</file>
+
 <file path=ppt/slides/slide2.xml><?xml version="1.0" encoding="utf-8"?>
 <p:sld xmlns:a="http://schemas.openxmlformats.org/drawingml/2006/main" xmlns:r="http://schemas.openxmlformats.org/officeDocument/2006/relationships" xmlns:p="http://schemas.openxmlformats.org/presentationml/2006/main">
   <p:cSld>
@@ -8589,6 +8786,258 @@
           <a:chExt cx="0" cy="0"/>
         </a:xfrm>
       </p:grpSpPr>
+      <p:sp>
+        <p:nvSpPr>
+          <p:cNvPr id="14" name="Rectangle 9">
+            <a:extLst>
+              <a:ext uri="{FF2B5EF4-FFF2-40B4-BE49-F238E27FC236}">
+                <a16:creationId xmlns:a16="http://schemas.microsoft.com/office/drawing/2014/main" id="{81AEB8A9-B768-4E30-BA55-D919E6687343}"/>
+              </a:ext>
+              <a:ext uri="{C183D7F6-B498-43B3-948B-1728B52AA6E4}">
+                <adec:decorative xmlns:adec="http://schemas.microsoft.com/office/drawing/2017/decorative" val="1"/>
+              </a:ext>
+            </a:extLst>
+          </p:cNvPr>
+          <p:cNvSpPr>
+            <a:spLocks noGrp="1" noRot="1" noChangeAspect="1" noMove="1" noResize="1" noEditPoints="1" noAdjustHandles="1" noChangeArrowheads="1" noChangeShapeType="1" noTextEdit="1"/>
+          </p:cNvSpPr>
+          <p:nvPr>
+            <p:extLst>
+              <p:ext uri="{386F3935-93C4-4BCD-93E2-E3B085C9AB24}">
+                <p16:designElem xmlns:p16="http://schemas.microsoft.com/office/powerpoint/2015/main" val="1"/>
+              </p:ext>
+            </p:extLst>
+          </p:nvPr>
+        </p:nvSpPr>
+        <p:spPr>
+          <a:xfrm>
+            <a:off x="-10001" y="-2"/>
+            <a:ext cx="4069936" cy="6858002"/>
+          </a:xfrm>
+          <a:prstGeom prst="rect">
+            <a:avLst/>
+          </a:prstGeom>
+          <a:solidFill>
+            <a:schemeClr val="accent1"/>
+          </a:solidFill>
+          <a:ln>
+            <a:noFill/>
+          </a:ln>
+        </p:spPr>
+        <p:style>
+          <a:lnRef idx="2">
+            <a:schemeClr val="accent1">
+              <a:shade val="50000"/>
+            </a:schemeClr>
+          </a:lnRef>
+          <a:fillRef idx="1">
+            <a:schemeClr val="accent1"/>
+          </a:fillRef>
+          <a:effectRef idx="0">
+            <a:schemeClr val="accent1"/>
+          </a:effectRef>
+          <a:fontRef idx="minor">
+            <a:schemeClr val="lt1"/>
+          </a:fontRef>
+        </p:style>
+        <p:txBody>
+          <a:bodyPr rtlCol="0" anchor="ctr"/>
+          <a:lstStyle/>
+          <a:p>
+            <a:pPr marL="0" marR="0" lvl="0" indent="0" algn="ctr" defTabSz="914400" rtl="0" eaLnBrk="1" fontAlgn="auto" latinLnBrk="0" hangingPunct="1">
+              <a:lnSpc>
+                <a:spcPct val="100000"/>
+              </a:lnSpc>
+              <a:spcBef>
+                <a:spcPts val="0"/>
+              </a:spcBef>
+              <a:spcAft>
+                <a:spcPts val="0"/>
+              </a:spcAft>
+              <a:buClrTx/>
+              <a:buSzTx/>
+              <a:buFontTx/>
+              <a:buNone/>
+              <a:tabLst/>
+              <a:defRPr/>
+            </a:pPr>
+            <a:endParaRPr kumimoji="0" lang="en-US" sz="1800" b="0" i="0" u="none" strike="noStrike" kern="1200" cap="none" spc="0" normalizeH="0" baseline="0" noProof="0">
+              <a:ln>
+                <a:noFill/>
+              </a:ln>
+              <a:solidFill>
+                <a:prstClr val="white"/>
+              </a:solidFill>
+              <a:effectLst/>
+              <a:uLnTx/>
+              <a:uFillTx/>
+              <a:latin typeface="Calibri" panose="020F0502020204030204"/>
+              <a:ea typeface="+mn-ea"/>
+              <a:cs typeface="+mn-cs"/>
+            </a:endParaRPr>
+          </a:p>
+        </p:txBody>
+      </p:sp>
+      <p:sp>
+        <p:nvSpPr>
+          <p:cNvPr id="2" name="Title 1">
+            <a:extLst>
+              <a:ext uri="{FF2B5EF4-FFF2-40B4-BE49-F238E27FC236}">
+                <a16:creationId xmlns:a16="http://schemas.microsoft.com/office/drawing/2014/main" id="{6E5F0ECA-F9B3-418E-9B18-E7005CBB6D94}"/>
+              </a:ext>
+            </a:extLst>
+          </p:cNvPr>
+          <p:cNvSpPr>
+            <a:spLocks noGrp="1"/>
+          </p:cNvSpPr>
+          <p:nvPr>
+            <p:ph type="title"/>
+          </p:nvPr>
+        </p:nvSpPr>
+        <p:spPr>
+          <a:xfrm>
+            <a:off x="643467" y="640080"/>
+            <a:ext cx="3096427" cy="5613236"/>
+          </a:xfrm>
+        </p:spPr>
+        <p:txBody>
+          <a:bodyPr anchor="ctr">
+            <a:normAutofit/>
+          </a:bodyPr>
+          <a:lstStyle/>
+          <a:p>
+            <a:r>
+              <a:rPr lang="en-US">
+                <a:solidFill>
+                  <a:srgbClr val="FFFFFF"/>
+                </a:solidFill>
+              </a:rPr>
+              <a:t>Alcohol by Volume Summary</a:t>
+            </a:r>
+          </a:p>
+        </p:txBody>
+      </p:sp>
+      <p:sp>
+        <p:nvSpPr>
+          <p:cNvPr id="3" name="Content Placeholder 2">
+            <a:extLst>
+              <a:ext uri="{FF2B5EF4-FFF2-40B4-BE49-F238E27FC236}">
+                <a16:creationId xmlns:a16="http://schemas.microsoft.com/office/drawing/2014/main" id="{8DF10654-9D1F-44CF-B529-202C68BAB0B4}"/>
+              </a:ext>
+            </a:extLst>
+          </p:cNvPr>
+          <p:cNvSpPr>
+            <a:spLocks noGrp="1"/>
+          </p:cNvSpPr>
+          <p:nvPr>
+            <p:ph idx="1"/>
+          </p:nvPr>
+        </p:nvSpPr>
+        <p:spPr>
+          <a:xfrm>
+            <a:off x="4699818" y="640082"/>
+            <a:ext cx="6848715" cy="2484884"/>
+          </a:xfrm>
+        </p:spPr>
+        <p:txBody>
+          <a:bodyPr anchor="ctr">
+            <a:normAutofit/>
+          </a:bodyPr>
+          <a:lstStyle/>
+          <a:p>
+            <a:endParaRPr lang="en-US" sz="1700" dirty="0"/>
+          </a:p>
+          <a:p>
+            <a:endParaRPr lang="en-US" sz="1700" dirty="0"/>
+          </a:p>
+          <a:p>
+            <a:r>
+              <a:rPr lang="en-US" sz="1700" dirty="0"/>
+              <a:t>There are 62 cases with no ABV data, which could be non-alcoholic beer.</a:t>
+            </a:r>
+          </a:p>
+          <a:p>
+            <a:r>
+              <a:rPr lang="en-US" sz="1700" dirty="0"/>
+              <a:t>The lowest is .001, which is considered non alcoholic and the highest is 12.8%, which is quite high for a beer.</a:t>
+            </a:r>
+          </a:p>
+          <a:p>
+            <a:r>
+              <a:rPr lang="en-US" sz="1700" dirty="0"/>
+              <a:t>50% of the data lies between 5 and 6.7 % ABV, which seems typical of beer.</a:t>
+            </a:r>
+          </a:p>
+        </p:txBody>
+      </p:sp>
+      <p:pic>
+        <p:nvPicPr>
+          <p:cNvPr id="5" name="Picture 4">
+            <a:extLst>
+              <a:ext uri="{FF2B5EF4-FFF2-40B4-BE49-F238E27FC236}">
+                <a16:creationId xmlns:a16="http://schemas.microsoft.com/office/drawing/2014/main" id="{BA709D40-1C24-4C46-B485-56AE2BBA3231}"/>
+              </a:ext>
+            </a:extLst>
+          </p:cNvPr>
+          <p:cNvPicPr>
+            <a:picLocks noChangeAspect="1"/>
+          </p:cNvPicPr>
+          <p:nvPr/>
+        </p:nvPicPr>
+        <p:blipFill>
+          <a:blip r:embed="rId2"/>
+          <a:stretch>
+            <a:fillRect/>
+          </a:stretch>
+        </p:blipFill>
+        <p:spPr>
+          <a:xfrm>
+            <a:off x="4654297" y="4113971"/>
+            <a:ext cx="6894236" cy="1153788"/>
+          </a:xfrm>
+          <a:prstGeom prst="rect">
+            <a:avLst/>
+          </a:prstGeom>
+        </p:spPr>
+      </p:pic>
+    </p:spTree>
+    <p:extLst>
+      <p:ext uri="{BB962C8B-B14F-4D97-AF65-F5344CB8AC3E}">
+        <p14:creationId xmlns:p14="http://schemas.microsoft.com/office/powerpoint/2010/main" val="1790436302"/>
+      </p:ext>
+    </p:extLst>
+  </p:cSld>
+  <p:clrMapOvr>
+    <a:masterClrMapping/>
+  </p:clrMapOvr>
+</p:sld>
+</file>
+
+<file path=ppt/slides/slide8.xml><?xml version="1.0" encoding="utf-8"?>
+<p:sld xmlns:a="http://schemas.openxmlformats.org/drawingml/2006/main" xmlns:r="http://schemas.openxmlformats.org/officeDocument/2006/relationships" xmlns:p="http://schemas.openxmlformats.org/presentationml/2006/main">
+  <p:cSld>
+    <p:bg>
+      <p:bgPr>
+        <a:solidFill>
+          <a:schemeClr val="bg1"/>
+        </a:solidFill>
+        <a:effectLst/>
+      </p:bgPr>
+    </p:bg>
+    <p:spTree>
+      <p:nvGrpSpPr>
+        <p:cNvPr id="1" name=""/>
+        <p:cNvGrpSpPr/>
+        <p:nvPr/>
+      </p:nvGrpSpPr>
+      <p:grpSpPr>
+        <a:xfrm>
+          <a:off x="0" y="0"/>
+          <a:ext cx="0" cy="0"/>
+          <a:chOff x="0" y="0"/>
+          <a:chExt cx="0" cy="0"/>
+        </a:xfrm>
+      </p:grpSpPr>
       <p:pic>
         <p:nvPicPr>
           <p:cNvPr id="4" name="Picture 3">
@@ -8827,7 +9276,7 @@
 </p:sld>
 </file>
 
-<file path=ppt/slides/slide8.xml><?xml version="1.0" encoding="utf-8"?>
+<file path=ppt/slides/slide9.xml><?xml version="1.0" encoding="utf-8"?>
 <p:sld xmlns:a="http://schemas.openxmlformats.org/drawingml/2006/main" xmlns:r="http://schemas.openxmlformats.org/officeDocument/2006/relationships" xmlns:p="http://schemas.openxmlformats.org/presentationml/2006/main">
   <p:cSld>
     <p:bg>
@@ -9141,202 +9590,6 @@
     <p:extLst>
       <p:ext uri="{BB962C8B-B14F-4D97-AF65-F5344CB8AC3E}">
         <p14:creationId xmlns:p14="http://schemas.microsoft.com/office/powerpoint/2010/main" val="3070774847"/>
-      </p:ext>
-    </p:extLst>
-  </p:cSld>
-  <p:clrMapOvr>
-    <a:masterClrMapping/>
-  </p:clrMapOvr>
-</p:sld>
-</file>
-
-<file path=ppt/slides/slide9.xml><?xml version="1.0" encoding="utf-8"?>
-<p:sld xmlns:a="http://schemas.openxmlformats.org/drawingml/2006/main" xmlns:r="http://schemas.openxmlformats.org/officeDocument/2006/relationships" xmlns:p="http://schemas.openxmlformats.org/presentationml/2006/main">
-  <p:cSld>
-    <p:bg>
-      <p:bgPr>
-        <a:solidFill>
-          <a:schemeClr val="bg1"/>
-        </a:solidFill>
-        <a:effectLst/>
-      </p:bgPr>
-    </p:bg>
-    <p:spTree>
-      <p:nvGrpSpPr>
-        <p:cNvPr id="1" name=""/>
-        <p:cNvGrpSpPr/>
-        <p:nvPr/>
-      </p:nvGrpSpPr>
-      <p:grpSpPr>
-        <a:xfrm>
-          <a:off x="0" y="0"/>
-          <a:ext cx="0" cy="0"/>
-          <a:chOff x="0" y="0"/>
-          <a:chExt cx="0" cy="0"/>
-        </a:xfrm>
-      </p:grpSpPr>
-      <p:sp>
-        <p:nvSpPr>
-          <p:cNvPr id="9" name="Rectangle 8">
-            <a:extLst>
-              <a:ext uri="{FF2B5EF4-FFF2-40B4-BE49-F238E27FC236}">
-                <a16:creationId xmlns:a16="http://schemas.microsoft.com/office/drawing/2014/main" id="{32BC26D8-82FB-445E-AA49-62A77D7C1EE0}"/>
-              </a:ext>
-              <a:ext uri="{C183D7F6-B498-43B3-948B-1728B52AA6E4}">
-                <adec:decorative xmlns:adec="http://schemas.microsoft.com/office/drawing/2017/decorative" val="1"/>
-              </a:ext>
-            </a:extLst>
-          </p:cNvPr>
-          <p:cNvSpPr>
-            <a:spLocks noGrp="1" noRot="1" noChangeAspect="1" noMove="1" noResize="1" noEditPoints="1" noAdjustHandles="1" noChangeArrowheads="1" noChangeShapeType="1" noTextEdit="1"/>
-          </p:cNvSpPr>
-          <p:nvPr>
-            <p:extLst>
-              <p:ext uri="{386F3935-93C4-4BCD-93E2-E3B085C9AB24}">
-                <p16:designElem xmlns:p16="http://schemas.microsoft.com/office/powerpoint/2015/main" val="1"/>
-              </p:ext>
-            </p:extLst>
-          </p:nvPr>
-        </p:nvSpPr>
-        <p:spPr>
-          <a:xfrm>
-            <a:off x="0" y="0"/>
-            <a:ext cx="12192000" cy="6858000"/>
-          </a:xfrm>
-          <a:prstGeom prst="rect">
-            <a:avLst/>
-          </a:prstGeom>
-          <a:solidFill>
-            <a:srgbClr val="573B60"/>
-          </a:solidFill>
-          <a:ln>
-            <a:noFill/>
-          </a:ln>
-        </p:spPr>
-        <p:style>
-          <a:lnRef idx="2">
-            <a:schemeClr val="accent1">
-              <a:shade val="50000"/>
-            </a:schemeClr>
-          </a:lnRef>
-          <a:fillRef idx="1">
-            <a:schemeClr val="accent1"/>
-          </a:fillRef>
-          <a:effectRef idx="0">
-            <a:schemeClr val="accent1"/>
-          </a:effectRef>
-          <a:fontRef idx="minor">
-            <a:schemeClr val="lt1"/>
-          </a:fontRef>
-        </p:style>
-        <p:txBody>
-          <a:bodyPr rtlCol="0" anchor="ctr"/>
-          <a:lstStyle/>
-          <a:p>
-            <a:pPr algn="ctr"/>
-            <a:endParaRPr lang="en-US"/>
-          </a:p>
-        </p:txBody>
-      </p:sp>
-      <p:sp>
-        <p:nvSpPr>
-          <p:cNvPr id="18" name="Rectangle 10">
-            <a:extLst>
-              <a:ext uri="{FF2B5EF4-FFF2-40B4-BE49-F238E27FC236}">
-                <a16:creationId xmlns:a16="http://schemas.microsoft.com/office/drawing/2014/main" id="{CB44330D-EA18-4254-AA95-EB49948539B8}"/>
-              </a:ext>
-              <a:ext uri="{C183D7F6-B498-43B3-948B-1728B52AA6E4}">
-                <adec:decorative xmlns:adec="http://schemas.microsoft.com/office/drawing/2017/decorative" val="1"/>
-              </a:ext>
-            </a:extLst>
-          </p:cNvPr>
-          <p:cNvSpPr>
-            <a:spLocks noGrp="1" noRot="1" noChangeAspect="1" noMove="1" noResize="1" noEditPoints="1" noAdjustHandles="1" noChangeArrowheads="1" noChangeShapeType="1" noTextEdit="1"/>
-          </p:cNvSpPr>
-          <p:nvPr>
-            <p:extLst>
-              <p:ext uri="{386F3935-93C4-4BCD-93E2-E3B085C9AB24}">
-                <p16:designElem xmlns:p16="http://schemas.microsoft.com/office/powerpoint/2015/main" val="1"/>
-              </p:ext>
-            </p:extLst>
-          </p:nvPr>
-        </p:nvSpPr>
-        <p:spPr>
-          <a:xfrm>
-            <a:off x="477012" y="480060"/>
-            <a:ext cx="11237976" cy="5897880"/>
-          </a:xfrm>
-          <a:prstGeom prst="rect">
-            <a:avLst/>
-          </a:prstGeom>
-          <a:solidFill>
-            <a:srgbClr val="FFFFFF"/>
-          </a:solidFill>
-          <a:ln>
-            <a:noFill/>
-          </a:ln>
-        </p:spPr>
-        <p:style>
-          <a:lnRef idx="2">
-            <a:schemeClr val="accent1">
-              <a:shade val="50000"/>
-            </a:schemeClr>
-          </a:lnRef>
-          <a:fillRef idx="1">
-            <a:schemeClr val="accent1"/>
-          </a:fillRef>
-          <a:effectRef idx="0">
-            <a:schemeClr val="accent1"/>
-          </a:effectRef>
-          <a:fontRef idx="minor">
-            <a:schemeClr val="lt1"/>
-          </a:fontRef>
-        </p:style>
-        <p:txBody>
-          <a:bodyPr rtlCol="0" anchor="ctr"/>
-          <a:lstStyle/>
-          <a:p>
-            <a:pPr algn="ctr"/>
-            <a:endParaRPr lang="en-US"/>
-          </a:p>
-        </p:txBody>
-      </p:sp>
-      <p:pic>
-        <p:nvPicPr>
-          <p:cNvPr id="4" name="Content Placeholder 3">
-            <a:extLst>
-              <a:ext uri="{FF2B5EF4-FFF2-40B4-BE49-F238E27FC236}">
-                <a16:creationId xmlns:a16="http://schemas.microsoft.com/office/drawing/2014/main" id="{AEA84A54-3E3C-47A8-B2E7-7A4F3ED57571}"/>
-              </a:ext>
-            </a:extLst>
-          </p:cNvPr>
-          <p:cNvPicPr>
-            <a:picLocks noGrp="1" noChangeAspect="1"/>
-          </p:cNvPicPr>
-          <p:nvPr>
-            <p:ph idx="1"/>
-          </p:nvPr>
-        </p:nvPicPr>
-        <p:blipFill>
-          <a:blip r:embed="rId2"/>
-          <a:stretch>
-            <a:fillRect/>
-          </a:stretch>
-        </p:blipFill>
-        <p:spPr>
-          <a:xfrm>
-            <a:off x="2044316" y="643467"/>
-            <a:ext cx="8103367" cy="5571066"/>
-          </a:xfrm>
-          <a:prstGeom prst="rect">
-            <a:avLst/>
-          </a:prstGeom>
-        </p:spPr>
-      </p:pic>
-    </p:spTree>
-    <p:extLst>
-      <p:ext uri="{BB962C8B-B14F-4D97-AF65-F5344CB8AC3E}">
-        <p14:creationId xmlns:p14="http://schemas.microsoft.com/office/powerpoint/2010/main" val="1174345792"/>
       </p:ext>
     </p:extLst>
   </p:cSld>

</xml_diff>